<commit_message>
Comentarios de Rosa a la prelectura
</commit_message>
<xml_diff>
--- a/Appendices/PL_012.pptx
+++ b/Appendices/PL_012.pptx
@@ -288,7 +288,7 @@
           <a:p>
             <a:fld id="{552D1098-5542-4C00-80F8-968512A25559}" type="datetimeFigureOut">
               <a:rPr lang="es-ES" smtClean="0"/>
-              <a:t>01/01/2016</a:t>
+              <a:t>30/07/2016</a:t>
             </a:fld>
             <a:endParaRPr lang="es-ES"/>
           </a:p>
@@ -458,7 +458,7 @@
           <a:p>
             <a:fld id="{552D1098-5542-4C00-80F8-968512A25559}" type="datetimeFigureOut">
               <a:rPr lang="es-ES" smtClean="0"/>
-              <a:t>01/01/2016</a:t>
+              <a:t>30/07/2016</a:t>
             </a:fld>
             <a:endParaRPr lang="es-ES"/>
           </a:p>
@@ -638,7 +638,7 @@
           <a:p>
             <a:fld id="{552D1098-5542-4C00-80F8-968512A25559}" type="datetimeFigureOut">
               <a:rPr lang="es-ES" smtClean="0"/>
-              <a:t>01/01/2016</a:t>
+              <a:t>30/07/2016</a:t>
             </a:fld>
             <a:endParaRPr lang="es-ES"/>
           </a:p>
@@ -808,7 +808,7 @@
           <a:p>
             <a:fld id="{552D1098-5542-4C00-80F8-968512A25559}" type="datetimeFigureOut">
               <a:rPr lang="es-ES" smtClean="0"/>
-              <a:t>01/01/2016</a:t>
+              <a:t>30/07/2016</a:t>
             </a:fld>
             <a:endParaRPr lang="es-ES"/>
           </a:p>
@@ -1054,7 +1054,7 @@
           <a:p>
             <a:fld id="{552D1098-5542-4C00-80F8-968512A25559}" type="datetimeFigureOut">
               <a:rPr lang="es-ES" smtClean="0"/>
-              <a:t>01/01/2016</a:t>
+              <a:t>30/07/2016</a:t>
             </a:fld>
             <a:endParaRPr lang="es-ES"/>
           </a:p>
@@ -1342,7 +1342,7 @@
           <a:p>
             <a:fld id="{552D1098-5542-4C00-80F8-968512A25559}" type="datetimeFigureOut">
               <a:rPr lang="es-ES" smtClean="0"/>
-              <a:t>01/01/2016</a:t>
+              <a:t>30/07/2016</a:t>
             </a:fld>
             <a:endParaRPr lang="es-ES"/>
           </a:p>
@@ -1769,7 +1769,7 @@
           <a:p>
             <a:fld id="{552D1098-5542-4C00-80F8-968512A25559}" type="datetimeFigureOut">
               <a:rPr lang="es-ES" smtClean="0"/>
-              <a:t>01/01/2016</a:t>
+              <a:t>30/07/2016</a:t>
             </a:fld>
             <a:endParaRPr lang="es-ES"/>
           </a:p>
@@ -1887,7 +1887,7 @@
           <a:p>
             <a:fld id="{552D1098-5542-4C00-80F8-968512A25559}" type="datetimeFigureOut">
               <a:rPr lang="es-ES" smtClean="0"/>
-              <a:t>01/01/2016</a:t>
+              <a:t>30/07/2016</a:t>
             </a:fld>
             <a:endParaRPr lang="es-ES"/>
           </a:p>
@@ -1982,7 +1982,7 @@
           <a:p>
             <a:fld id="{552D1098-5542-4C00-80F8-968512A25559}" type="datetimeFigureOut">
               <a:rPr lang="es-ES" smtClean="0"/>
-              <a:t>01/01/2016</a:t>
+              <a:t>30/07/2016</a:t>
             </a:fld>
             <a:endParaRPr lang="es-ES"/>
           </a:p>
@@ -2259,7 +2259,7 @@
           <a:p>
             <a:fld id="{552D1098-5542-4C00-80F8-968512A25559}" type="datetimeFigureOut">
               <a:rPr lang="es-ES" smtClean="0"/>
-              <a:t>01/01/2016</a:t>
+              <a:t>30/07/2016</a:t>
             </a:fld>
             <a:endParaRPr lang="es-ES"/>
           </a:p>
@@ -2512,7 +2512,7 @@
           <a:p>
             <a:fld id="{552D1098-5542-4C00-80F8-968512A25559}" type="datetimeFigureOut">
               <a:rPr lang="es-ES" smtClean="0"/>
-              <a:t>01/01/2016</a:t>
+              <a:t>30/07/2016</a:t>
             </a:fld>
             <a:endParaRPr lang="es-ES"/>
           </a:p>
@@ -2725,7 +2725,7 @@
           <a:p>
             <a:fld id="{552D1098-5542-4C00-80F8-968512A25559}" type="datetimeFigureOut">
               <a:rPr lang="es-ES" smtClean="0"/>
-              <a:t>01/01/2016</a:t>
+              <a:t>30/07/2016</a:t>
             </a:fld>
             <a:endParaRPr lang="es-ES"/>
           </a:p>
@@ -3532,6 +3532,126 @@
           </a:fontRef>
         </p:style>
       </p:cxnSp>
+      <p:sp>
+        <p:nvSpPr>
+          <p:cNvPr id="2" name="1 CuadroTexto"/>
+          <p:cNvSpPr txBox="1"/>
+          <p:nvPr/>
+        </p:nvSpPr>
+        <p:spPr>
+          <a:xfrm>
+            <a:off x="3501008" y="98212"/>
+            <a:ext cx="576064" cy="369332"/>
+          </a:xfrm>
+          <a:prstGeom prst="rect">
+            <a:avLst/>
+          </a:prstGeom>
+          <a:noFill/>
+        </p:spPr>
+        <p:txBody>
+          <a:bodyPr wrap="square" rtlCol="0">
+            <a:spAutoFit/>
+          </a:bodyPr>
+          <a:lstStyle/>
+          <a:p>
+            <a:r>
+              <a:rPr lang="es-ES" dirty="0" smtClean="0"/>
+              <a:t>a)</a:t>
+            </a:r>
+            <a:endParaRPr lang="es-ES" dirty="0"/>
+          </a:p>
+        </p:txBody>
+      </p:sp>
+      <p:sp>
+        <p:nvSpPr>
+          <p:cNvPr id="3" name="2 CuadroTexto"/>
+          <p:cNvSpPr txBox="1"/>
+          <p:nvPr/>
+        </p:nvSpPr>
+        <p:spPr>
+          <a:xfrm>
+            <a:off x="6038190" y="2156547"/>
+            <a:ext cx="1639619" cy="369332"/>
+          </a:xfrm>
+          <a:prstGeom prst="rect">
+            <a:avLst/>
+          </a:prstGeom>
+          <a:noFill/>
+        </p:spPr>
+        <p:txBody>
+          <a:bodyPr wrap="square" rtlCol="0">
+            <a:spAutoFit/>
+          </a:bodyPr>
+          <a:lstStyle/>
+          <a:p>
+            <a:r>
+              <a:rPr lang="es-ES" dirty="0" smtClean="0"/>
+              <a:t>b)</a:t>
+            </a:r>
+            <a:endParaRPr lang="es-ES" dirty="0"/>
+          </a:p>
+        </p:txBody>
+      </p:sp>
+      <p:sp>
+        <p:nvSpPr>
+          <p:cNvPr id="4" name="3 CuadroTexto"/>
+          <p:cNvSpPr txBox="1"/>
+          <p:nvPr/>
+        </p:nvSpPr>
+        <p:spPr>
+          <a:xfrm>
+            <a:off x="5445224" y="6018373"/>
+            <a:ext cx="504056" cy="369332"/>
+          </a:xfrm>
+          <a:prstGeom prst="rect">
+            <a:avLst/>
+          </a:prstGeom>
+          <a:noFill/>
+        </p:spPr>
+        <p:txBody>
+          <a:bodyPr wrap="square" rtlCol="0">
+            <a:spAutoFit/>
+          </a:bodyPr>
+          <a:lstStyle/>
+          <a:p>
+            <a:r>
+              <a:rPr lang="es-ES" dirty="0" smtClean="0"/>
+              <a:t>c)</a:t>
+            </a:r>
+            <a:endParaRPr lang="es-ES" dirty="0"/>
+          </a:p>
+        </p:txBody>
+      </p:sp>
+      <p:sp>
+        <p:nvSpPr>
+          <p:cNvPr id="5" name="4 CuadroTexto"/>
+          <p:cNvSpPr txBox="1"/>
+          <p:nvPr/>
+        </p:nvSpPr>
+        <p:spPr>
+          <a:xfrm>
+            <a:off x="1775681" y="5023998"/>
+            <a:ext cx="377026" cy="369332"/>
+          </a:xfrm>
+          <a:prstGeom prst="rect">
+            <a:avLst/>
+          </a:prstGeom>
+          <a:noFill/>
+        </p:spPr>
+        <p:txBody>
+          <a:bodyPr wrap="none" rtlCol="0">
+            <a:spAutoFit/>
+          </a:bodyPr>
+          <a:lstStyle/>
+          <a:p>
+            <a:r>
+              <a:rPr lang="es-ES" dirty="0" smtClean="0"/>
+              <a:t>d)</a:t>
+            </a:r>
+            <a:endParaRPr lang="es-ES" dirty="0"/>
+          </a:p>
+        </p:txBody>
+      </p:sp>
     </p:spTree>
     <p:extLst>
       <p:ext uri="{BB962C8B-B14F-4D97-AF65-F5344CB8AC3E}">

</xml_diff>